<commit_message>
Update Zowe 22PI4 Planning - Introduction and Agenda.pptx
Add 22PI4 Innovation Sprint Opening

Signed-off-by: Nicholas Kocsis <kocsis@ca.ibm.com>
</commit_message>
<xml_diff>
--- a/Project Management/PI Planning/22PI4 Planning/Zowe 22PI4 Planning - Introduction and Agenda.pptx
+++ b/Project Management/PI Planning/22PI4 Planning/Zowe 22PI4 Planning - Introduction and Agenda.pptx
@@ -6997,7 +6997,7 @@
                 </a:solidFill>
                 <a:ea typeface="Gill Sans"/>
               </a:rPr>
-              <a:t>Zowe 22PI3 Planning</a:t>
+              <a:t>Zowe 22PI4 Planning</a:t>
             </a:r>
           </a:p>
           <a:p>
@@ -7957,7 +7957,25 @@
                 </a:solidFill>
                 <a:latin typeface="Arial"/>
               </a:rPr>
-              <a:t>(11:00 – 5:00)</a:t>
+              <a:t>(</a:t>
+            </a:r>
+            <a:r>
+              <a:rPr lang="en-US" sz="1600" spc="-1" dirty="0">
+                <a:solidFill>
+                  <a:srgbClr val="000000"/>
+                </a:solidFill>
+                <a:latin typeface="Arial"/>
+              </a:rPr>
+              <a:t>9</a:t>
+            </a:r>
+            <a:r>
+              <a:rPr lang="en-US" sz="1600" b="0" strike="noStrike" spc="-1" dirty="0">
+                <a:solidFill>
+                  <a:srgbClr val="000000"/>
+                </a:solidFill>
+                <a:latin typeface="Arial"/>
+              </a:rPr>
+              <a:t>:00 – 5:00)</a:t>
             </a:r>
           </a:p>
           <a:p>
@@ -8837,7 +8855,7 @@
                 <a:latin typeface="Arial" panose="020B0604020202020204" pitchFamily="34" charset="0"/>
                 <a:cs typeface="Arial" panose="020B0604020202020204" pitchFamily="34" charset="0"/>
               </a:rPr>
-              <a:t>Zowe 22PI3 Close</a:t>
+              <a:t>Zowe 22PI4 Close</a:t>
             </a:r>
             <a:endParaRPr lang="en-US" sz="2800" b="0" strike="noStrike" spc="-1" dirty="0">
               <a:solidFill>

</xml_diff>